<commit_message>
Update 07.01 qiskit hackathon presentation.pptx
</commit_message>
<xml_diff>
--- a/presentation/07.01 qiskit hackathon presentation.pptx
+++ b/presentation/07.01 qiskit hackathon presentation.pptx
@@ -257,7 +257,7 @@
       <p15:sldGuideLst xmlns:p15="http://schemas.microsoft.com/office/powerpoint/2012/main"/>
     </p:ext>
     <p:ext uri="http://customooxmlschemas.google.com/">
-      <go:slidesCustomData xmlns:go="http://customooxmlschemas.google.com/" xmlns:p15="http://schemas.microsoft.com/office/powerpoint/2012/main" xmlns:p14="http://schemas.microsoft.com/office/powerpoint/2010/main" xmlns:com="http://schemas.openxmlformats.org/drawingml/2006/compatibility" xmlns:pvml="urn:schemas-microsoft-com:office:powerpoint" xmlns:v="urn:schemas-microsoft-com:vml" xmlns:o="urn:schemas-microsoft-com:office:office" xmlns:dgm="http://schemas.openxmlformats.org/drawingml/2006/diagram" xmlns:c="http://schemas.openxmlformats.org/drawingml/2006/chart" xmlns:mv="urn:schemas-microsoft-com:mac:vml" xmlns:mc="http://schemas.openxmlformats.org/markup-compatibility/2006" xmlns="" r:id="rId15" roundtripDataSignature="AMtx7mj53DZJD3IeK49OkMfod2F7tpBjdQ=="/>
+      <go:slidesCustomData xmlns="" xmlns:mc="http://schemas.openxmlformats.org/markup-compatibility/2006" xmlns:mv="urn:schemas-microsoft-com:mac:vml" xmlns:c="http://schemas.openxmlformats.org/drawingml/2006/chart" xmlns:dgm="http://schemas.openxmlformats.org/drawingml/2006/diagram" xmlns:o="urn:schemas-microsoft-com:office:office" xmlns:v="urn:schemas-microsoft-com:vml" xmlns:pvml="urn:schemas-microsoft-com:office:powerpoint" xmlns:com="http://schemas.openxmlformats.org/drawingml/2006/compatibility" xmlns:p14="http://schemas.microsoft.com/office/powerpoint/2010/main" xmlns:p15="http://schemas.microsoft.com/office/powerpoint/2012/main" xmlns:go="http://customooxmlschemas.google.com/" r:id="rId15" roundtripDataSignature="AMtx7mj53DZJD3IeK49OkMfod2F7tpBjdQ=="/>
     </p:ext>
   </p:extLst>
 </p:presentation>
@@ -14191,8 +14191,8 @@
           </a:p>
         </p:txBody>
       </p:sp>
-      <mc:AlternateContent xmlns:mc="http://schemas.openxmlformats.org/markup-compatibility/2006">
-        <mc:Choice xmlns:a14="http://schemas.microsoft.com/office/drawing/2010/main" Requires="a14">
+      <mc:AlternateContent xmlns:mc="http://schemas.openxmlformats.org/markup-compatibility/2006" xmlns:a14="http://schemas.microsoft.com/office/drawing/2010/main">
+        <mc:Choice Requires="a14">
           <p:sp>
             <p:nvSpPr>
               <p:cNvPr id="8" name="文本框 7">
@@ -14458,7 +14458,7 @@
             </p:txBody>
           </p:sp>
         </mc:Choice>
-        <mc:Fallback>
+        <mc:Fallback xmlns="">
           <p:sp>
             <p:nvSpPr>
               <p:cNvPr id="8" name="文本框 7">
@@ -21834,8 +21834,8 @@
         </p:nvCxnSpPr>
         <p:spPr>
           <a:xfrm flipV="1">
-            <a:off x="1669908" y="3811305"/>
-            <a:ext cx="1491572" cy="1026950"/>
+            <a:off x="1669908" y="3795274"/>
+            <a:ext cx="1222731" cy="1042981"/>
           </a:xfrm>
           <a:prstGeom prst="straightConnector1">
             <a:avLst/>
@@ -21859,8 +21859,8 @@
           </a:fontRef>
         </p:style>
       </p:cxnSp>
-      <mc:AlternateContent xmlns:mc="http://schemas.openxmlformats.org/markup-compatibility/2006" xmlns:a14="http://schemas.microsoft.com/office/drawing/2010/main">
-        <mc:Choice Requires="a14">
+      <mc:AlternateContent xmlns:mc="http://schemas.openxmlformats.org/markup-compatibility/2006">
+        <mc:Choice xmlns:a14="http://schemas.microsoft.com/office/drawing/2010/main" Requires="a14">
           <p:sp>
             <p:nvSpPr>
               <p:cNvPr id="10" name="文本框 9">
@@ -21875,8 +21875,8 @@
             </p:nvSpPr>
             <p:spPr>
               <a:xfrm>
-                <a:off x="3161480" y="3580472"/>
-                <a:ext cx="1479478" cy="461665"/>
+                <a:off x="2892639" y="3564441"/>
+                <a:ext cx="2022730" cy="461665"/>
               </a:xfrm>
               <a:prstGeom prst="rect">
                 <a:avLst/>
@@ -21916,6 +21916,53 @@
                             <a:rPr lang="zh-CN" altLang="en-US" sz="2400" b="1"/>
                             <m:t>∃</m:t>
                           </m:r>
+                          <m:sSub>
+                            <m:sSubPr>
+                              <m:ctrlPr>
+                                <a:rPr lang="en-US" altLang="zh-CN" sz="2400" i="1">
+                                  <a:solidFill>
+                                    <a:schemeClr val="dk1"/>
+                                  </a:solidFill>
+                                  <a:latin typeface="Cambria Math" panose="02040503050406030204" pitchFamily="18" charset="0"/>
+                                  <a:ea typeface="Cambria Math" panose="02040503050406030204" pitchFamily="18" charset="0"/>
+                                </a:rPr>
+                              </m:ctrlPr>
+                            </m:sSubPr>
+                            <m:e>
+                              <m:r>
+                                <a:rPr lang="en-US" altLang="zh-CN" sz="2400" i="1">
+                                  <a:solidFill>
+                                    <a:schemeClr val="dk1"/>
+                                  </a:solidFill>
+                                  <a:latin typeface="Cambria Math" panose="02040503050406030204" pitchFamily="18" charset="0"/>
+                                  <a:ea typeface="Cambria Math" panose="02040503050406030204" pitchFamily="18" charset="0"/>
+                                </a:rPr>
+                                <m:t>𝑝</m:t>
+                              </m:r>
+                            </m:e>
+                            <m:sub>
+                              <m:r>
+                                <a:rPr lang="en-US" altLang="zh-CN" sz="2400" i="1">
+                                  <a:solidFill>
+                                    <a:schemeClr val="dk1"/>
+                                  </a:solidFill>
+                                  <a:latin typeface="Cambria Math" panose="02040503050406030204" pitchFamily="18" charset="0"/>
+                                  <a:ea typeface="Cambria Math" panose="02040503050406030204" pitchFamily="18" charset="0"/>
+                                </a:rPr>
+                                <m:t>𝑖</m:t>
+                              </m:r>
+                            </m:sub>
+                          </m:sSub>
+                          <m:r>
+                            <a:rPr lang="en-US" altLang="zh-CN" sz="2400" b="0" i="1" smtClean="0">
+                              <a:solidFill>
+                                <a:schemeClr val="dk1"/>
+                              </a:solidFill>
+                              <a:latin typeface="Cambria Math" panose="02040503050406030204" pitchFamily="18" charset="0"/>
+                              <a:ea typeface="Cambria Math" panose="02040503050406030204" pitchFamily="18" charset="0"/>
+                            </a:rPr>
+                            <m:t>(</m:t>
+                          </m:r>
                           <m:r>
                             <a:rPr lang="en-US" altLang="zh-CN" sz="2400" i="1">
                               <a:solidFill>
@@ -21941,6 +21988,16 @@
                         </m:sub>
                       </m:sSub>
                       <m:r>
+                        <a:rPr lang="en-US" altLang="zh-CN" sz="2400" b="0" i="1" smtClean="0">
+                          <a:solidFill>
+                            <a:schemeClr val="dk1"/>
+                          </a:solidFill>
+                          <a:latin typeface="Cambria Math" panose="02040503050406030204" pitchFamily="18" charset="0"/>
+                          <a:ea typeface="Cambria Math" panose="02040503050406030204" pitchFamily="18" charset="0"/>
+                        </a:rPr>
+                        <m:t> </m:t>
+                      </m:r>
+                      <m:r>
                         <a:rPr lang="zh-CN" altLang="en-US" sz="2400" i="1">
                           <a:solidFill>
                             <a:schemeClr val="dk1"/>
@@ -21960,6 +22017,16 @@
                         </a:rPr>
                         <m:t>0.5</m:t>
                       </m:r>
+                      <m:r>
+                        <a:rPr lang="en-US" altLang="zh-CN" sz="2400" b="0" i="1" smtClean="0">
+                          <a:solidFill>
+                            <a:schemeClr val="dk1"/>
+                          </a:solidFill>
+                          <a:latin typeface="Cambria Math" panose="02040503050406030204" pitchFamily="18" charset="0"/>
+                          <a:ea typeface="Cambria Math" panose="02040503050406030204" pitchFamily="18" charset="0"/>
+                        </a:rPr>
+                        <m:t>)</m:t>
+                      </m:r>
                     </m:oMath>
                   </m:oMathPara>
                 </a14:m>
@@ -21968,7 +22035,7 @@
             </p:txBody>
           </p:sp>
         </mc:Choice>
-        <mc:Fallback xmlns="">
+        <mc:Fallback>
           <p:sp>
             <p:nvSpPr>
               <p:cNvPr id="10" name="文本框 9">
@@ -21985,8 +22052,8 @@
             </p:nvSpPr>
             <p:spPr>
               <a:xfrm>
-                <a:off x="3161480" y="3580472"/>
-                <a:ext cx="1479478" cy="461665"/>
+                <a:off x="2892639" y="3564441"/>
+                <a:ext cx="2022730" cy="461665"/>
               </a:xfrm>
               <a:prstGeom prst="rect">
                 <a:avLst/>
@@ -21994,7 +22061,7 @@
               <a:blipFill>
                 <a:blip r:embed="rId3"/>
                 <a:stretch>
-                  <a:fillRect b="-13158"/>
+                  <a:fillRect b="-21333"/>
                 </a:stretch>
               </a:blipFill>
             </p:spPr>
@@ -23224,8 +23291,8 @@
         </p:nvCxnSpPr>
         <p:spPr>
           <a:xfrm flipV="1">
-            <a:off x="4640958" y="3035791"/>
-            <a:ext cx="1517625" cy="775514"/>
+            <a:off x="4915369" y="3035791"/>
+            <a:ext cx="1243214" cy="759483"/>
           </a:xfrm>
           <a:prstGeom prst="straightConnector1">
             <a:avLst/>
@@ -23302,9 +23369,9 @@
           <p:nvPr/>
         </p:nvCxnSpPr>
         <p:spPr>
-          <a:xfrm flipV="1">
-            <a:off x="4640958" y="3803660"/>
-            <a:ext cx="1505187" cy="7645"/>
+          <a:xfrm>
+            <a:off x="4915369" y="3795274"/>
+            <a:ext cx="1230776" cy="8386"/>
           </a:xfrm>
           <a:prstGeom prst="straightConnector1">
             <a:avLst/>
@@ -23346,8 +23413,8 @@
         </p:nvCxnSpPr>
         <p:spPr>
           <a:xfrm>
-            <a:off x="4640958" y="3811305"/>
-            <a:ext cx="1553109" cy="943154"/>
+            <a:off x="4915369" y="3795274"/>
+            <a:ext cx="1278698" cy="959185"/>
           </a:xfrm>
           <a:prstGeom prst="straightConnector1">
             <a:avLst/>
@@ -25127,14 +25194,14 @@
           <p:cNvCxnSpPr>
             <a:cxnSpLocks/>
             <a:stCxn id="5" idx="3"/>
-            <a:endCxn id="10" idx="1"/>
+            <a:endCxn id="47" idx="1"/>
           </p:cNvCxnSpPr>
           <p:nvPr/>
         </p:nvCxnSpPr>
         <p:spPr>
           <a:xfrm flipV="1">
-            <a:off x="1669908" y="3811305"/>
-            <a:ext cx="1491572" cy="1026950"/>
+            <a:off x="1669908" y="3795274"/>
+            <a:ext cx="1222731" cy="1042981"/>
           </a:xfrm>
           <a:prstGeom prst="straightConnector1">
             <a:avLst/>
@@ -25158,160 +25225,6 @@
           </a:fontRef>
         </p:style>
       </p:cxnSp>
-      <mc:AlternateContent xmlns:mc="http://schemas.openxmlformats.org/markup-compatibility/2006" xmlns:a14="http://schemas.microsoft.com/office/drawing/2010/main">
-        <mc:Choice Requires="a14">
-          <p:sp>
-            <p:nvSpPr>
-              <p:cNvPr id="10" name="文本框 9">
-                <a:extLst>
-                  <a:ext uri="{FF2B5EF4-FFF2-40B4-BE49-F238E27FC236}">
-                    <a16:creationId xmlns:a16="http://schemas.microsoft.com/office/drawing/2014/main" id="{AC57712B-A679-4540-B1F0-1594A94EDE38}"/>
-                  </a:ext>
-                </a:extLst>
-              </p:cNvPr>
-              <p:cNvSpPr txBox="1"/>
-              <p:nvPr/>
-            </p:nvSpPr>
-            <p:spPr>
-              <a:xfrm>
-                <a:off x="3161480" y="3580472"/>
-                <a:ext cx="1479478" cy="461665"/>
-              </a:xfrm>
-              <a:prstGeom prst="rect">
-                <a:avLst/>
-              </a:prstGeom>
-              <a:noFill/>
-            </p:spPr>
-            <p:txBody>
-              <a:bodyPr wrap="square" rtlCol="0">
-                <a:spAutoFit/>
-              </a:bodyPr>
-              <a:lstStyle/>
-              <a:p>
-                <a:pPr/>
-                <a14:m>
-                  <m:oMathPara xmlns:m="http://schemas.openxmlformats.org/officeDocument/2006/math">
-                    <m:oMathParaPr>
-                      <m:jc m:val="centerGroup"/>
-                    </m:oMathParaPr>
-                    <m:oMath xmlns:m="http://schemas.openxmlformats.org/officeDocument/2006/math">
-                      <m:sSub>
-                        <m:sSubPr>
-                          <m:ctrlPr>
-                            <a:rPr lang="en-US" altLang="zh-CN" sz="2400" i="1" smtClean="0">
-                              <a:solidFill>
-                                <a:schemeClr val="dk1"/>
-                              </a:solidFill>
-                              <a:latin typeface="Cambria Math" panose="02040503050406030204" pitchFamily="18" charset="0"/>
-                              <a:ea typeface="Cambria Math" panose="02040503050406030204" pitchFamily="18" charset="0"/>
-                            </a:rPr>
-                          </m:ctrlPr>
-                        </m:sSubPr>
-                        <m:e>
-                          <m:r>
-                            <m:rPr>
-                              <m:nor/>
-                            </m:rPr>
-                            <a:rPr lang="zh-CN" altLang="en-US" sz="2400" b="1"/>
-                            <m:t>∃</m:t>
-                          </m:r>
-                          <m:r>
-                            <a:rPr lang="en-US" altLang="zh-CN" sz="2400" i="1">
-                              <a:solidFill>
-                                <a:schemeClr val="dk1"/>
-                              </a:solidFill>
-                              <a:latin typeface="Cambria Math" panose="02040503050406030204" pitchFamily="18" charset="0"/>
-                              <a:ea typeface="Cambria Math" panose="02040503050406030204" pitchFamily="18" charset="0"/>
-                            </a:rPr>
-                            <m:t>𝑝</m:t>
-                          </m:r>
-                        </m:e>
-                        <m:sub>
-                          <m:r>
-                            <a:rPr lang="en-US" altLang="zh-CN" sz="2400" b="0" i="1" smtClean="0">
-                              <a:solidFill>
-                                <a:schemeClr val="dk1"/>
-                              </a:solidFill>
-                              <a:latin typeface="Cambria Math" panose="02040503050406030204" pitchFamily="18" charset="0"/>
-                              <a:ea typeface="Cambria Math" panose="02040503050406030204" pitchFamily="18" charset="0"/>
-                            </a:rPr>
-                            <m:t>𝑖</m:t>
-                          </m:r>
-                        </m:sub>
-                      </m:sSub>
-                      <m:r>
-                        <a:rPr lang="zh-CN" altLang="en-US" sz="2400" i="1">
-                          <a:solidFill>
-                            <a:schemeClr val="dk1"/>
-                          </a:solidFill>
-                          <a:latin typeface="Cambria Math" panose="02040503050406030204" pitchFamily="18" charset="0"/>
-                          <a:ea typeface="Cambria Math" panose="02040503050406030204" pitchFamily="18" charset="0"/>
-                        </a:rPr>
-                        <m:t>≥</m:t>
-                      </m:r>
-                      <m:r>
-                        <a:rPr lang="en-US" altLang="zh-CN" sz="2400" b="0" i="1" smtClean="0">
-                          <a:solidFill>
-                            <a:schemeClr val="dk1"/>
-                          </a:solidFill>
-                          <a:latin typeface="Cambria Math" panose="02040503050406030204" pitchFamily="18" charset="0"/>
-                          <a:ea typeface="Cambria Math" panose="02040503050406030204" pitchFamily="18" charset="0"/>
-                        </a:rPr>
-                        <m:t>0.5</m:t>
-                      </m:r>
-                    </m:oMath>
-                  </m:oMathPara>
-                </a14:m>
-                <a:endParaRPr lang="zh-CN" altLang="en-US" sz="2400" dirty="0"/>
-              </a:p>
-            </p:txBody>
-          </p:sp>
-        </mc:Choice>
-        <mc:Fallback xmlns="">
-          <p:sp>
-            <p:nvSpPr>
-              <p:cNvPr id="10" name="文本框 9">
-                <a:extLst>
-                  <a:ext uri="{FF2B5EF4-FFF2-40B4-BE49-F238E27FC236}">
-                    <a16:creationId xmlns:a16="http://schemas.microsoft.com/office/drawing/2014/main" id="{AC57712B-A679-4540-B1F0-1594A94EDE38}"/>
-                  </a:ext>
-                </a:extLst>
-              </p:cNvPr>
-              <p:cNvSpPr txBox="1">
-                <a:spLocks noRot="1" noChangeAspect="1" noMove="1" noResize="1" noEditPoints="1" noAdjustHandles="1" noChangeArrowheads="1" noChangeShapeType="1" noTextEdit="1"/>
-              </p:cNvSpPr>
-              <p:nvPr/>
-            </p:nvSpPr>
-            <p:spPr>
-              <a:xfrm>
-                <a:off x="3161480" y="3580472"/>
-                <a:ext cx="1479478" cy="461665"/>
-              </a:xfrm>
-              <a:prstGeom prst="rect">
-                <a:avLst/>
-              </a:prstGeom>
-              <a:blipFill>
-                <a:blip r:embed="rId3"/>
-                <a:stretch>
-                  <a:fillRect b="-13158"/>
-                </a:stretch>
-              </a:blipFill>
-            </p:spPr>
-            <p:txBody>
-              <a:bodyPr/>
-              <a:lstStyle/>
-              <a:p>
-                <a:r>
-                  <a:rPr lang="zh-CN" altLang="en-US">
-                    <a:noFill/>
-                  </a:rPr>
-                  <a:t> </a:t>
-                </a:r>
-              </a:p>
-            </p:txBody>
-          </p:sp>
-        </mc:Fallback>
-      </mc:AlternateContent>
       <mc:AlternateContent xmlns:mc="http://schemas.openxmlformats.org/markup-compatibility/2006" xmlns:a14="http://schemas.microsoft.com/office/drawing/2010/main">
         <mc:Choice Requires="a14">
           <p:sp>
@@ -26516,15 +26429,15 @@
           </p:cNvPr>
           <p:cNvCxnSpPr>
             <a:cxnSpLocks/>
-            <a:stCxn id="10" idx="3"/>
+            <a:stCxn id="47" idx="3"/>
             <a:endCxn id="26" idx="1"/>
           </p:cNvCxnSpPr>
           <p:nvPr/>
         </p:nvCxnSpPr>
         <p:spPr>
           <a:xfrm flipV="1">
-            <a:off x="4640958" y="3035791"/>
-            <a:ext cx="1517625" cy="775514"/>
+            <a:off x="4915369" y="3035791"/>
+            <a:ext cx="1243214" cy="759483"/>
           </a:xfrm>
           <a:prstGeom prst="straightConnector1">
             <a:avLst/>
@@ -26595,15 +26508,15 @@
           </p:cNvPr>
           <p:cNvCxnSpPr>
             <a:cxnSpLocks/>
-            <a:stCxn id="10" idx="3"/>
+            <a:stCxn id="47" idx="3"/>
             <a:endCxn id="27" idx="1"/>
           </p:cNvCxnSpPr>
           <p:nvPr/>
         </p:nvCxnSpPr>
         <p:spPr>
-          <a:xfrm flipV="1">
-            <a:off x="4640958" y="3803660"/>
-            <a:ext cx="1505187" cy="7645"/>
+          <a:xfrm>
+            <a:off x="4915369" y="3795274"/>
+            <a:ext cx="1230776" cy="8386"/>
           </a:xfrm>
           <a:prstGeom prst="straightConnector1">
             <a:avLst/>
@@ -26638,15 +26551,15 @@
           </p:cNvPr>
           <p:cNvCxnSpPr>
             <a:cxnSpLocks/>
-            <a:stCxn id="10" idx="3"/>
+            <a:stCxn id="47" idx="3"/>
             <a:endCxn id="29" idx="1"/>
           </p:cNvCxnSpPr>
           <p:nvPr/>
         </p:nvCxnSpPr>
         <p:spPr>
           <a:xfrm>
-            <a:off x="4640958" y="3811305"/>
-            <a:ext cx="1553109" cy="943154"/>
+            <a:off x="4915369" y="3795274"/>
+            <a:ext cx="1278698" cy="959185"/>
           </a:xfrm>
           <a:prstGeom prst="straightConnector1">
             <a:avLst/>
@@ -28111,6 +28024,227 @@
           </a:p>
         </p:txBody>
       </p:sp>
+      <mc:AlternateContent xmlns:mc="http://schemas.openxmlformats.org/markup-compatibility/2006">
+        <mc:Choice xmlns:a14="http://schemas.microsoft.com/office/drawing/2010/main" Requires="a14">
+          <p:sp>
+            <p:nvSpPr>
+              <p:cNvPr id="47" name="文本框 46">
+                <a:extLst>
+                  <a:ext uri="{FF2B5EF4-FFF2-40B4-BE49-F238E27FC236}">
+                    <a16:creationId xmlns:a16="http://schemas.microsoft.com/office/drawing/2014/main" id="{3A137A5D-A32A-4988-81F2-F7FEAA7F6289}"/>
+                  </a:ext>
+                </a:extLst>
+              </p:cNvPr>
+              <p:cNvSpPr txBox="1"/>
+              <p:nvPr/>
+            </p:nvSpPr>
+            <p:spPr>
+              <a:xfrm>
+                <a:off x="2892639" y="3564441"/>
+                <a:ext cx="2022730" cy="461665"/>
+              </a:xfrm>
+              <a:prstGeom prst="rect">
+                <a:avLst/>
+              </a:prstGeom>
+              <a:noFill/>
+            </p:spPr>
+            <p:txBody>
+              <a:bodyPr wrap="square" rtlCol="0">
+                <a:spAutoFit/>
+              </a:bodyPr>
+              <a:lstStyle/>
+              <a:p>
+                <a:pPr/>
+                <a14:m>
+                  <m:oMathPara xmlns:m="http://schemas.openxmlformats.org/officeDocument/2006/math">
+                    <m:oMathParaPr>
+                      <m:jc m:val="centerGroup"/>
+                    </m:oMathParaPr>
+                    <m:oMath xmlns:m="http://schemas.openxmlformats.org/officeDocument/2006/math">
+                      <m:sSub>
+                        <m:sSubPr>
+                          <m:ctrlPr>
+                            <a:rPr lang="en-US" altLang="zh-CN" sz="2400" i="1" smtClean="0">
+                              <a:solidFill>
+                                <a:schemeClr val="dk1"/>
+                              </a:solidFill>
+                              <a:latin typeface="Cambria Math" panose="02040503050406030204" pitchFamily="18" charset="0"/>
+                              <a:ea typeface="Cambria Math" panose="02040503050406030204" pitchFamily="18" charset="0"/>
+                            </a:rPr>
+                          </m:ctrlPr>
+                        </m:sSubPr>
+                        <m:e>
+                          <m:r>
+                            <m:rPr>
+                              <m:nor/>
+                            </m:rPr>
+                            <a:rPr lang="zh-CN" altLang="en-US" sz="2400" b="1"/>
+                            <m:t>∃</m:t>
+                          </m:r>
+                          <m:sSub>
+                            <m:sSubPr>
+                              <m:ctrlPr>
+                                <a:rPr lang="en-US" altLang="zh-CN" sz="2400" i="1">
+                                  <a:solidFill>
+                                    <a:schemeClr val="dk1"/>
+                                  </a:solidFill>
+                                  <a:latin typeface="Cambria Math" panose="02040503050406030204" pitchFamily="18" charset="0"/>
+                                  <a:ea typeface="Cambria Math" panose="02040503050406030204" pitchFamily="18" charset="0"/>
+                                </a:rPr>
+                              </m:ctrlPr>
+                            </m:sSubPr>
+                            <m:e>
+                              <m:r>
+                                <a:rPr lang="en-US" altLang="zh-CN" sz="2400" i="1">
+                                  <a:solidFill>
+                                    <a:schemeClr val="dk1"/>
+                                  </a:solidFill>
+                                  <a:latin typeface="Cambria Math" panose="02040503050406030204" pitchFamily="18" charset="0"/>
+                                  <a:ea typeface="Cambria Math" panose="02040503050406030204" pitchFamily="18" charset="0"/>
+                                </a:rPr>
+                                <m:t>𝑝</m:t>
+                              </m:r>
+                            </m:e>
+                            <m:sub>
+                              <m:r>
+                                <a:rPr lang="en-US" altLang="zh-CN" sz="2400" i="1">
+                                  <a:solidFill>
+                                    <a:schemeClr val="dk1"/>
+                                  </a:solidFill>
+                                  <a:latin typeface="Cambria Math" panose="02040503050406030204" pitchFamily="18" charset="0"/>
+                                  <a:ea typeface="Cambria Math" panose="02040503050406030204" pitchFamily="18" charset="0"/>
+                                </a:rPr>
+                                <m:t>𝑖</m:t>
+                              </m:r>
+                            </m:sub>
+                          </m:sSub>
+                          <m:r>
+                            <a:rPr lang="en-US" altLang="zh-CN" sz="2400" b="0" i="1" smtClean="0">
+                              <a:solidFill>
+                                <a:schemeClr val="dk1"/>
+                              </a:solidFill>
+                              <a:latin typeface="Cambria Math" panose="02040503050406030204" pitchFamily="18" charset="0"/>
+                              <a:ea typeface="Cambria Math" panose="02040503050406030204" pitchFamily="18" charset="0"/>
+                            </a:rPr>
+                            <m:t>(</m:t>
+                          </m:r>
+                          <m:r>
+                            <a:rPr lang="en-US" altLang="zh-CN" sz="2400" i="1">
+                              <a:solidFill>
+                                <a:schemeClr val="dk1"/>
+                              </a:solidFill>
+                              <a:latin typeface="Cambria Math" panose="02040503050406030204" pitchFamily="18" charset="0"/>
+                              <a:ea typeface="Cambria Math" panose="02040503050406030204" pitchFamily="18" charset="0"/>
+                            </a:rPr>
+                            <m:t>𝑝</m:t>
+                          </m:r>
+                        </m:e>
+                        <m:sub>
+                          <m:r>
+                            <a:rPr lang="en-US" altLang="zh-CN" sz="2400" b="0" i="1" smtClean="0">
+                              <a:solidFill>
+                                <a:schemeClr val="dk1"/>
+                              </a:solidFill>
+                              <a:latin typeface="Cambria Math" panose="02040503050406030204" pitchFamily="18" charset="0"/>
+                              <a:ea typeface="Cambria Math" panose="02040503050406030204" pitchFamily="18" charset="0"/>
+                            </a:rPr>
+                            <m:t>𝑖</m:t>
+                          </m:r>
+                        </m:sub>
+                      </m:sSub>
+                      <m:r>
+                        <a:rPr lang="en-US" altLang="zh-CN" sz="2400" b="0" i="1" smtClean="0">
+                          <a:solidFill>
+                            <a:schemeClr val="dk1"/>
+                          </a:solidFill>
+                          <a:latin typeface="Cambria Math" panose="02040503050406030204" pitchFamily="18" charset="0"/>
+                          <a:ea typeface="Cambria Math" panose="02040503050406030204" pitchFamily="18" charset="0"/>
+                        </a:rPr>
+                        <m:t> </m:t>
+                      </m:r>
+                      <m:r>
+                        <a:rPr lang="zh-CN" altLang="en-US" sz="2400" i="1">
+                          <a:solidFill>
+                            <a:schemeClr val="dk1"/>
+                          </a:solidFill>
+                          <a:latin typeface="Cambria Math" panose="02040503050406030204" pitchFamily="18" charset="0"/>
+                          <a:ea typeface="Cambria Math" panose="02040503050406030204" pitchFamily="18" charset="0"/>
+                        </a:rPr>
+                        <m:t>≥</m:t>
+                      </m:r>
+                      <m:r>
+                        <a:rPr lang="en-US" altLang="zh-CN" sz="2400" b="0" i="1" smtClean="0">
+                          <a:solidFill>
+                            <a:schemeClr val="dk1"/>
+                          </a:solidFill>
+                          <a:latin typeface="Cambria Math" panose="02040503050406030204" pitchFamily="18" charset="0"/>
+                          <a:ea typeface="Cambria Math" panose="02040503050406030204" pitchFamily="18" charset="0"/>
+                        </a:rPr>
+                        <m:t>0.5</m:t>
+                      </m:r>
+                      <m:r>
+                        <a:rPr lang="en-US" altLang="zh-CN" sz="2400" b="0" i="1" smtClean="0">
+                          <a:solidFill>
+                            <a:schemeClr val="dk1"/>
+                          </a:solidFill>
+                          <a:latin typeface="Cambria Math" panose="02040503050406030204" pitchFamily="18" charset="0"/>
+                          <a:ea typeface="Cambria Math" panose="02040503050406030204" pitchFamily="18" charset="0"/>
+                        </a:rPr>
+                        <m:t>)</m:t>
+                      </m:r>
+                    </m:oMath>
+                  </m:oMathPara>
+                </a14:m>
+                <a:endParaRPr lang="zh-CN" altLang="en-US" sz="2400" dirty="0"/>
+              </a:p>
+            </p:txBody>
+          </p:sp>
+        </mc:Choice>
+        <mc:Fallback>
+          <p:sp>
+            <p:nvSpPr>
+              <p:cNvPr id="47" name="文本框 46">
+                <a:extLst>
+                  <a:ext uri="{FF2B5EF4-FFF2-40B4-BE49-F238E27FC236}">
+                    <a16:creationId xmlns:a16="http://schemas.microsoft.com/office/drawing/2014/main" id="{3A137A5D-A32A-4988-81F2-F7FEAA7F6289}"/>
+                  </a:ext>
+                </a:extLst>
+              </p:cNvPr>
+              <p:cNvSpPr txBox="1">
+                <a:spLocks noRot="1" noChangeAspect="1" noMove="1" noResize="1" noEditPoints="1" noAdjustHandles="1" noChangeArrowheads="1" noChangeShapeType="1" noTextEdit="1"/>
+              </p:cNvSpPr>
+              <p:nvPr/>
+            </p:nvSpPr>
+            <p:spPr>
+              <a:xfrm>
+                <a:off x="2892639" y="3564441"/>
+                <a:ext cx="2022730" cy="461665"/>
+              </a:xfrm>
+              <a:prstGeom prst="rect">
+                <a:avLst/>
+              </a:prstGeom>
+              <a:blipFill>
+                <a:blip r:embed="rId20"/>
+                <a:stretch>
+                  <a:fillRect b="-21333"/>
+                </a:stretch>
+              </a:blipFill>
+            </p:spPr>
+            <p:txBody>
+              <a:bodyPr/>
+              <a:lstStyle/>
+              <a:p>
+                <a:r>
+                  <a:rPr lang="zh-CN" altLang="en-US">
+                    <a:noFill/>
+                  </a:rPr>
+                  <a:t> </a:t>
+                </a:r>
+              </a:p>
+            </p:txBody>
+          </p:sp>
+        </mc:Fallback>
+      </mc:AlternateContent>
     </p:spTree>
     <p:extLst>
       <p:ext uri="{BB962C8B-B14F-4D97-AF65-F5344CB8AC3E}">

</xml_diff>